<commit_message>
Updated power point and solved small bug
</commit_message>
<xml_diff>
--- a/GPP_ZombieAI_Lozano_Miguel_2DAE10.pptx
+++ b/GPP_ZombieAI_Lozano_Miguel_2DAE10.pptx
@@ -28,12 +28,11 @@
     <p:sldId id="285" r:id="rId25"/>
     <p:sldId id="296" r:id="rId26"/>
     <p:sldId id="297" r:id="rId27"/>
-    <p:sldId id="298" r:id="rId28"/>
-    <p:sldId id="299" r:id="rId29"/>
-    <p:sldId id="300" r:id="rId30"/>
-    <p:sldId id="274" r:id="rId31"/>
-    <p:sldId id="301" r:id="rId32"/>
-    <p:sldId id="287" r:id="rId33"/>
+    <p:sldId id="299" r:id="rId28"/>
+    <p:sldId id="274" r:id="rId29"/>
+    <p:sldId id="304" r:id="rId30"/>
+    <p:sldId id="301" r:id="rId31"/>
+    <p:sldId id="287" r:id="rId32"/>
   </p:sldIdLst>
   <p:sldSz cx="12192000" cy="6858000"/>
   <p:notesSz cx="6858000" cy="9144000"/>
@@ -22461,7 +22460,7 @@
         </p:nvSpPr>
         <p:spPr>
           <a:xfrm>
-            <a:off x="4937760" y="198120"/>
+            <a:off x="5034030" y="198120"/>
             <a:ext cx="3312160" cy="769441"/>
           </a:xfrm>
           <a:prstGeom prst="rect">
@@ -23370,7 +23369,7 @@
         </p:blipFill>
         <p:spPr>
           <a:xfrm>
-            <a:off x="361993" y="1190625"/>
+            <a:off x="314368" y="1463129"/>
             <a:ext cx="11715707" cy="3931742"/>
           </a:xfrm>
           <a:prstGeom prst="rect">
@@ -23378,6 +23377,42 @@
           </a:prstGeom>
         </p:spPr>
       </p:pic>
+      <p:sp>
+        <p:nvSpPr>
+          <p:cNvPr id="6" name="TextBox 5">
+            <a:extLst>
+              <a:ext uri="{FF2B5EF4-FFF2-40B4-BE49-F238E27FC236}">
+                <a16:creationId xmlns:a16="http://schemas.microsoft.com/office/drawing/2014/main" id="{D8BD7B7B-4C9A-A8F7-A712-B1F42198C02C}"/>
+              </a:ext>
+            </a:extLst>
+          </p:cNvPr>
+          <p:cNvSpPr txBox="1"/>
+          <p:nvPr/>
+        </p:nvSpPr>
+        <p:spPr>
+          <a:xfrm>
+            <a:off x="4164860" y="398145"/>
+            <a:ext cx="4426689" cy="769441"/>
+          </a:xfrm>
+          <a:prstGeom prst="rect">
+            <a:avLst/>
+          </a:prstGeom>
+          <a:noFill/>
+        </p:spPr>
+        <p:txBody>
+          <a:bodyPr wrap="square">
+            <a:spAutoFit/>
+          </a:bodyPr>
+          <a:lstStyle/>
+          <a:p>
+            <a:r>
+              <a:rPr lang="en-US" sz="4400" b="1" dirty="0"/>
+              <a:t>Find Connections</a:t>
+            </a:r>
+            <a:endParaRPr lang="en-BE" sz="4400" b="1" dirty="0"/>
+          </a:p>
+        </p:txBody>
+      </p:sp>
     </p:spTree>
     <p:extLst>
       <p:ext uri="{BB962C8B-B14F-4D97-AF65-F5344CB8AC3E}">
@@ -23690,7 +23725,7 @@
         </p:blipFill>
         <p:spPr>
           <a:xfrm>
-            <a:off x="4194909" y="643857"/>
+            <a:off x="4166334" y="702294"/>
             <a:ext cx="3057525" cy="1495425"/>
           </a:xfrm>
           <a:prstGeom prst="rect">
@@ -24026,7 +24061,7 @@
         </p:blipFill>
         <p:spPr>
           <a:xfrm>
-            <a:off x="3930740" y="1843453"/>
+            <a:off x="3177996" y="1897819"/>
             <a:ext cx="4362986" cy="504090"/>
           </a:xfrm>
           <a:prstGeom prst="rect">
@@ -24276,7 +24311,7 @@
         </p:blipFill>
         <p:spPr>
           <a:xfrm>
-            <a:off x="1811427" y="4877947"/>
+            <a:off x="6628530" y="4877947"/>
             <a:ext cx="4238625" cy="1619250"/>
           </a:xfrm>
           <a:prstGeom prst="rect">
@@ -24512,6 +24547,36 @@
           </a:p>
         </p:txBody>
       </p:sp>
+      <p:pic>
+        <p:nvPicPr>
+          <p:cNvPr id="51" name="Picture 50">
+            <a:extLst>
+              <a:ext uri="{FF2B5EF4-FFF2-40B4-BE49-F238E27FC236}">
+                <a16:creationId xmlns:a16="http://schemas.microsoft.com/office/drawing/2014/main" id="{4D81B2D7-67AE-E95B-CCCD-105DDCB7CAC2}"/>
+              </a:ext>
+            </a:extLst>
+          </p:cNvPr>
+          <p:cNvPicPr>
+            <a:picLocks noChangeAspect="1"/>
+          </p:cNvPicPr>
+          <p:nvPr/>
+        </p:nvPicPr>
+        <p:blipFill>
+          <a:blip r:embed="rId4"/>
+          <a:stretch>
+            <a:fillRect/>
+          </a:stretch>
+        </p:blipFill>
+        <p:spPr>
+          <a:xfrm>
+            <a:off x="172570" y="5092711"/>
+            <a:ext cx="6151164" cy="385988"/>
+          </a:xfrm>
+          <a:prstGeom prst="rect">
+            <a:avLst/>
+          </a:prstGeom>
+        </p:spPr>
+      </p:pic>
     </p:spTree>
     <p:extLst>
       <p:ext uri="{BB962C8B-B14F-4D97-AF65-F5344CB8AC3E}">
@@ -24594,8 +24659,8 @@
         </p:nvSpPr>
         <p:spPr>
           <a:xfrm>
-            <a:off x="2331576" y="2409086"/>
-            <a:ext cx="7778583" cy="1569660"/>
+            <a:off x="2331577" y="2409086"/>
+            <a:ext cx="7745874" cy="1569660"/>
           </a:xfrm>
           <a:prstGeom prst="rect">
             <a:avLst/>
@@ -24789,8 +24854,8 @@
         </p:blipFill>
         <p:spPr>
           <a:xfrm>
-            <a:off x="5525227" y="1800045"/>
-            <a:ext cx="4522629" cy="1663118"/>
+            <a:off x="5410927" y="1280287"/>
+            <a:ext cx="5843140" cy="2148713"/>
           </a:xfrm>
           <a:prstGeom prst="rect">
             <a:avLst/>
@@ -24812,7 +24877,7 @@
         <p:spPr>
           <a:xfrm>
             <a:off x="5311528" y="3926732"/>
-            <a:ext cx="6232584" cy="2031325"/>
+            <a:ext cx="6232584" cy="2585323"/>
           </a:xfrm>
           <a:prstGeom prst="rect">
             <a:avLst/>
@@ -24835,10 +24900,6 @@
             <a:endParaRPr lang="en-US" dirty="0"/>
           </a:p>
           <a:p>
-            <a:pPr>
-              <a:buFont typeface="Arial" panose="020B0604020202020204" pitchFamily="34" charset="0"/>
-              <a:buChar char="•"/>
-            </a:pPr>
             <a:r>
               <a:rPr lang="en-US" dirty="0"/>
               <a:t>Finds the </a:t>
@@ -24861,10 +24922,9 @@
             </a:r>
           </a:p>
           <a:p>
-            <a:pPr>
-              <a:buFont typeface="Arial" panose="020B0604020202020204" pitchFamily="34" charset="0"/>
-              <a:buChar char="•"/>
-            </a:pPr>
+            <a:endParaRPr lang="en-US" dirty="0"/>
+          </a:p>
+          <a:p>
             <a:r>
               <a:rPr lang="en-US" dirty="0"/>
               <a:t>Does </a:t>
@@ -24879,10 +24939,9 @@
             </a:r>
           </a:p>
           <a:p>
-            <a:pPr>
-              <a:buFont typeface="Arial" panose="020B0604020202020204" pitchFamily="34" charset="0"/>
-              <a:buChar char="•"/>
-            </a:pPr>
+            <a:endParaRPr lang="en-US" dirty="0"/>
+          </a:p>
+          <a:p>
             <a:r>
               <a:rPr lang="en-US" dirty="0"/>
               <a:t>Guarantees the </a:t>
@@ -24912,7 +24971,7 @@
         </p:nvSpPr>
         <p:spPr>
           <a:xfrm>
-            <a:off x="5115660" y="130502"/>
+            <a:off x="5115660" y="165514"/>
             <a:ext cx="3312160" cy="769441"/>
           </a:xfrm>
           <a:prstGeom prst="rect">
@@ -25062,7 +25121,7 @@
         <p:spPr>
           <a:xfrm>
             <a:off x="5229765" y="3293014"/>
-            <a:ext cx="6232584" cy="1477328"/>
+            <a:ext cx="6232584" cy="1754326"/>
           </a:xfrm>
           <a:prstGeom prst="rect">
             <a:avLst/>
@@ -25089,9 +25148,11 @@
           </a:p>
           <a:p>
             <a:pPr>
-              <a:buFont typeface="Arial" panose="020B0604020202020204" pitchFamily="34" charset="0"/>
-              <a:buChar char="•"/>
+              <a:buNone/>
             </a:pPr>
+            <a:endParaRPr lang="en-US" dirty="0"/>
+          </a:p>
+          <a:p>
             <a:r>
               <a:rPr lang="en-US" dirty="0"/>
               <a:t>Designed for shortest path from a source to a </a:t>
@@ -25106,10 +25167,9 @@
             </a:r>
           </a:p>
           <a:p>
-            <a:pPr>
-              <a:buFont typeface="Arial" panose="020B0604020202020204" pitchFamily="34" charset="0"/>
-              <a:buChar char="•"/>
-            </a:pPr>
+            <a:endParaRPr lang="en-US" dirty="0"/>
+          </a:p>
+          <a:p>
             <a:r>
               <a:rPr lang="en-US" dirty="0"/>
               <a:t>Uses a </a:t>
@@ -25124,10 +25184,6 @@
             </a:r>
           </a:p>
           <a:p>
-            <a:pPr>
-              <a:buFont typeface="Arial" panose="020B0604020202020204" pitchFamily="34" charset="0"/>
-              <a:buChar char="•"/>
-            </a:pPr>
             <a:r>
               <a:rPr lang="en-US" dirty="0"/>
               <a:t>Much faster than Dijkstra when a good heuristic is available.</a:t>
@@ -25149,7 +25205,7 @@
         </p:nvSpPr>
         <p:spPr>
           <a:xfrm>
-            <a:off x="4920507" y="527570"/>
+            <a:off x="4910982" y="556145"/>
             <a:ext cx="3312160" cy="769441"/>
           </a:xfrm>
           <a:prstGeom prst="rect">
@@ -25302,7 +25358,7 @@
         </p:nvSpPr>
         <p:spPr>
           <a:xfrm>
-            <a:off x="2430347" y="707395"/>
+            <a:off x="2992322" y="551107"/>
             <a:ext cx="7026503" cy="1325563"/>
           </a:xfrm>
         </p:spPr>
@@ -25314,9 +25370,162 @@
           <a:p>
             <a:r>
               <a:rPr lang="en-US" sz="7200" b="1" dirty="0"/>
-              <a:t>DIJKSTRA VS  A*</a:t>
+              <a:t>DIJKSTRA VS  A *</a:t>
             </a:r>
             <a:endParaRPr lang="en-BE" sz="7200" b="1" dirty="0"/>
+          </a:p>
+        </p:txBody>
+      </p:sp>
+      <p:sp>
+        <p:nvSpPr>
+          <p:cNvPr id="11" name="Rectangle 10">
+            <a:extLst>
+              <a:ext uri="{FF2B5EF4-FFF2-40B4-BE49-F238E27FC236}">
+                <a16:creationId xmlns:a16="http://schemas.microsoft.com/office/drawing/2014/main" id="{B76A36FC-DC2E-F7A8-860A-ADB37A4E573E}"/>
+              </a:ext>
+            </a:extLst>
+          </p:cNvPr>
+          <p:cNvSpPr/>
+          <p:nvPr/>
+        </p:nvSpPr>
+        <p:spPr>
+          <a:xfrm>
+            <a:off x="1133475" y="2047875"/>
+            <a:ext cx="9544050" cy="885825"/>
+          </a:xfrm>
+          <a:prstGeom prst="rect">
+            <a:avLst/>
+          </a:prstGeom>
+        </p:spPr>
+        <p:style>
+          <a:lnRef idx="2">
+            <a:schemeClr val="accent1">
+              <a:shade val="15000"/>
+            </a:schemeClr>
+          </a:lnRef>
+          <a:fillRef idx="1">
+            <a:schemeClr val="accent1"/>
+          </a:fillRef>
+          <a:effectRef idx="0">
+            <a:schemeClr val="accent1"/>
+          </a:effectRef>
+          <a:fontRef idx="minor">
+            <a:schemeClr val="lt1"/>
+          </a:fontRef>
+        </p:style>
+        <p:txBody>
+          <a:bodyPr rtlCol="0" anchor="ctr"/>
+          <a:lstStyle/>
+          <a:p>
+            <a:pPr algn="ctr"/>
+            <a:r>
+              <a:rPr lang="en-US" b="1" dirty="0"/>
+              <a:t>We don’t usually use A* in GOAP because heuristics are hard to design for abstract world states,</a:t>
+            </a:r>
+          </a:p>
+          <a:p>
+            <a:pPr algn="ctr"/>
+            <a:endParaRPr lang="en-US" dirty="0"/>
+          </a:p>
+        </p:txBody>
+      </p:sp>
+      <p:sp>
+        <p:nvSpPr>
+          <p:cNvPr id="12" name="Rectangle 11">
+            <a:extLst>
+              <a:ext uri="{FF2B5EF4-FFF2-40B4-BE49-F238E27FC236}">
+                <a16:creationId xmlns:a16="http://schemas.microsoft.com/office/drawing/2014/main" id="{46359319-F976-C53A-C19C-D3E84495135F}"/>
+              </a:ext>
+            </a:extLst>
+          </p:cNvPr>
+          <p:cNvSpPr/>
+          <p:nvPr/>
+        </p:nvSpPr>
+        <p:spPr>
+          <a:xfrm>
+            <a:off x="1171574" y="3512759"/>
+            <a:ext cx="9544050" cy="736332"/>
+          </a:xfrm>
+          <a:prstGeom prst="rect">
+            <a:avLst/>
+          </a:prstGeom>
+        </p:spPr>
+        <p:style>
+          <a:lnRef idx="2">
+            <a:schemeClr val="accent1">
+              <a:shade val="15000"/>
+            </a:schemeClr>
+          </a:lnRef>
+          <a:fillRef idx="1">
+            <a:schemeClr val="accent1"/>
+          </a:fillRef>
+          <a:effectRef idx="0">
+            <a:schemeClr val="accent1"/>
+          </a:effectRef>
+          <a:fontRef idx="minor">
+            <a:schemeClr val="lt1"/>
+          </a:fontRef>
+        </p:style>
+        <p:txBody>
+          <a:bodyPr rtlCol="0" anchor="ctr"/>
+          <a:lstStyle/>
+          <a:p>
+            <a:pPr algn="ctr"/>
+            <a:r>
+              <a:rPr lang="en-US" b="1" dirty="0"/>
+              <a:t>Dijkstra is safer and simpler → guarantees correct plans for any goal without extra work.</a:t>
+            </a:r>
+            <a:endParaRPr lang="en-US" dirty="0"/>
+          </a:p>
+        </p:txBody>
+      </p:sp>
+      <p:sp>
+        <p:nvSpPr>
+          <p:cNvPr id="13" name="Rectangle 12">
+            <a:extLst>
+              <a:ext uri="{FF2B5EF4-FFF2-40B4-BE49-F238E27FC236}">
+                <a16:creationId xmlns:a16="http://schemas.microsoft.com/office/drawing/2014/main" id="{03ECB0EF-FC36-5527-8ED5-FBD610A9C1F0}"/>
+              </a:ext>
+            </a:extLst>
+          </p:cNvPr>
+          <p:cNvSpPr/>
+          <p:nvPr/>
+        </p:nvSpPr>
+        <p:spPr>
+          <a:xfrm>
+            <a:off x="1171574" y="4868216"/>
+            <a:ext cx="9544050" cy="736332"/>
+          </a:xfrm>
+          <a:prstGeom prst="rect">
+            <a:avLst/>
+          </a:prstGeom>
+        </p:spPr>
+        <p:style>
+          <a:lnRef idx="2">
+            <a:schemeClr val="accent1">
+              <a:shade val="15000"/>
+            </a:schemeClr>
+          </a:lnRef>
+          <a:fillRef idx="1">
+            <a:schemeClr val="accent1"/>
+          </a:fillRef>
+          <a:effectRef idx="0">
+            <a:schemeClr val="accent1"/>
+          </a:effectRef>
+          <a:fontRef idx="minor">
+            <a:schemeClr val="lt1"/>
+          </a:fontRef>
+        </p:style>
+        <p:txBody>
+          <a:bodyPr rtlCol="0" anchor="ctr"/>
+          <a:lstStyle/>
+          <a:p>
+            <a:pPr algn="ctr"/>
+            <a:r>
+              <a:rPr lang="en-US" b="1" dirty="0"/>
+              <a:t> A* can be used in GOAP if you have a meaningful heuristic.</a:t>
+            </a:r>
+            <a:endParaRPr lang="en-US" dirty="0"/>
           </a:p>
         </p:txBody>
       </p:sp>
@@ -28441,41 +28650,6 @@
           </a:p>
         </p:txBody>
       </p:sp>
-      <p:sp>
-        <p:nvSpPr>
-          <p:cNvPr id="3" name="TextBox 2">
-            <a:extLst>
-              <a:ext uri="{FF2B5EF4-FFF2-40B4-BE49-F238E27FC236}">
-                <a16:creationId xmlns:a16="http://schemas.microsoft.com/office/drawing/2014/main" id="{992F7297-ED7C-E7AB-016F-2BD405A337DC}"/>
-              </a:ext>
-            </a:extLst>
-          </p:cNvPr>
-          <p:cNvSpPr txBox="1"/>
-          <p:nvPr/>
-        </p:nvSpPr>
-        <p:spPr>
-          <a:xfrm>
-            <a:off x="4597879" y="325012"/>
-            <a:ext cx="4097547" cy="369332"/>
-          </a:xfrm>
-          <a:prstGeom prst="rect">
-            <a:avLst/>
-          </a:prstGeom>
-          <a:noFill/>
-        </p:spPr>
-        <p:txBody>
-          <a:bodyPr wrap="square" rtlCol="0">
-            <a:spAutoFit/>
-          </a:bodyPr>
-          <a:lstStyle/>
-          <a:p>
-            <a:r>
-              <a:rPr lang="en-US" dirty="0"/>
-              <a:t>Code Structure </a:t>
-            </a:r>
-          </a:p>
-        </p:txBody>
-      </p:sp>
       <p:pic>
         <p:nvPicPr>
           <p:cNvPr id="5" name="Picture 4">
@@ -28498,7 +28672,7 @@
         </p:blipFill>
         <p:spPr>
           <a:xfrm>
-            <a:off x="1487932" y="797660"/>
+            <a:off x="1598042" y="986634"/>
             <a:ext cx="9220200" cy="1714500"/>
           </a:xfrm>
           <a:prstGeom prst="rect">
@@ -28706,593 +28880,6 @@
         <p:cNvPr id="1" name="">
           <a:extLst>
             <a:ext uri="{FF2B5EF4-FFF2-40B4-BE49-F238E27FC236}">
-              <a16:creationId xmlns:a16="http://schemas.microsoft.com/office/drawing/2014/main" id="{15EE6F1C-B0A3-F7DB-E885-78D9EE89285A}"/>
-            </a:ext>
-          </a:extLst>
-        </p:cNvPr>
-        <p:cNvGrpSpPr/>
-        <p:nvPr/>
-      </p:nvGrpSpPr>
-      <p:grpSpPr>
-        <a:xfrm>
-          <a:off x="0" y="0"/>
-          <a:ext cx="0" cy="0"/>
-          <a:chOff x="0" y="0"/>
-          <a:chExt cx="0" cy="0"/>
-        </a:xfrm>
-      </p:grpSpPr>
-      <p:sp>
-        <p:nvSpPr>
-          <p:cNvPr id="9" name="Tekstvak 8">
-            <a:extLst>
-              <a:ext uri="{FF2B5EF4-FFF2-40B4-BE49-F238E27FC236}">
-                <a16:creationId xmlns:a16="http://schemas.microsoft.com/office/drawing/2014/main" id="{3B273796-C5D5-AD49-04DD-57D3096C9237}"/>
-              </a:ext>
-            </a:extLst>
-          </p:cNvPr>
-          <p:cNvSpPr txBox="1"/>
-          <p:nvPr/>
-        </p:nvSpPr>
-        <p:spPr>
-          <a:xfrm>
-            <a:off x="-272288" y="2409086"/>
-            <a:ext cx="3520440" cy="423730"/>
-          </a:xfrm>
-          <a:prstGeom prst="rect">
-            <a:avLst/>
-          </a:prstGeom>
-          <a:noFill/>
-        </p:spPr>
-        <p:txBody>
-          <a:bodyPr wrap="square" rtlCol="0">
-            <a:spAutoFit/>
-          </a:bodyPr>
-          <a:lstStyle/>
-          <a:p>
-            <a:endParaRPr lang="nl-NL" dirty="0"/>
-          </a:p>
-        </p:txBody>
-      </p:sp>
-      <p:sp>
-        <p:nvSpPr>
-          <p:cNvPr id="10" name="AutoShape 2">
-            <a:extLst>
-              <a:ext uri="{FF2B5EF4-FFF2-40B4-BE49-F238E27FC236}">
-                <a16:creationId xmlns:a16="http://schemas.microsoft.com/office/drawing/2014/main" id="{5E853F3A-2764-F4D2-A66F-14E066217BCE}"/>
-              </a:ext>
-            </a:extLst>
-          </p:cNvPr>
-          <p:cNvSpPr>
-            <a:spLocks noChangeAspect="1" noChangeArrowheads="1"/>
-          </p:cNvSpPr>
-          <p:nvPr/>
-        </p:nvSpPr>
-        <p:spPr bwMode="auto">
-          <a:xfrm>
-            <a:off x="5943599" y="18691"/>
-            <a:ext cx="3562709" cy="3562709"/>
-          </a:xfrm>
-          <a:prstGeom prst="rect">
-            <a:avLst/>
-          </a:prstGeom>
-          <a:noFill/>
-          <a:extLst>
-            <a:ext uri="{909E8E84-426E-40DD-AFC4-6F175D3DCCD1}">
-              <a14:hiddenFill xmlns:a14="http://schemas.microsoft.com/office/drawing/2010/main">
-                <a:solidFill>
-                  <a:srgbClr val="FFFFFF"/>
-                </a:solidFill>
-              </a14:hiddenFill>
-            </a:ext>
-          </a:extLst>
-        </p:spPr>
-        <p:txBody>
-          <a:bodyPr vert="horz" wrap="square" lIns="91440" tIns="45720" rIns="91440" bIns="45720" numCol="1" anchor="t" anchorCtr="0" compatLnSpc="1">
-            <a:prstTxWarp prst="textNoShape">
-              <a:avLst/>
-            </a:prstTxWarp>
-          </a:bodyPr>
-          <a:lstStyle/>
-          <a:p>
-            <a:endParaRPr lang="en-US"/>
-          </a:p>
-        </p:txBody>
-      </p:sp>
-      <p:pic>
-        <p:nvPicPr>
-          <p:cNvPr id="7" name="Picture 6">
-            <a:extLst>
-              <a:ext uri="{FF2B5EF4-FFF2-40B4-BE49-F238E27FC236}">
-                <a16:creationId xmlns:a16="http://schemas.microsoft.com/office/drawing/2014/main" id="{61264449-D623-5658-9B41-CFEE5A8D0AAA}"/>
-              </a:ext>
-            </a:extLst>
-          </p:cNvPr>
-          <p:cNvPicPr>
-            <a:picLocks noChangeAspect="1"/>
-          </p:cNvPicPr>
-          <p:nvPr/>
-        </p:nvPicPr>
-        <p:blipFill>
-          <a:blip r:embed="rId2"/>
-          <a:stretch>
-            <a:fillRect/>
-          </a:stretch>
-        </p:blipFill>
-        <p:spPr>
-          <a:xfrm>
-            <a:off x="2556296" y="559238"/>
-            <a:ext cx="6457950" cy="609600"/>
-          </a:xfrm>
-          <a:prstGeom prst="rect">
-            <a:avLst/>
-          </a:prstGeom>
-        </p:spPr>
-      </p:pic>
-      <p:pic>
-        <p:nvPicPr>
-          <p:cNvPr id="18" name="Picture 17">
-            <a:extLst>
-              <a:ext uri="{FF2B5EF4-FFF2-40B4-BE49-F238E27FC236}">
-                <a16:creationId xmlns:a16="http://schemas.microsoft.com/office/drawing/2014/main" id="{659AB6B6-7B98-770B-3720-3157DC142FAF}"/>
-              </a:ext>
-            </a:extLst>
-          </p:cNvPr>
-          <p:cNvPicPr>
-            <a:picLocks noChangeAspect="1"/>
-          </p:cNvPicPr>
-          <p:nvPr/>
-        </p:nvPicPr>
-        <p:blipFill>
-          <a:blip r:embed="rId3"/>
-          <a:stretch>
-            <a:fillRect/>
-          </a:stretch>
-        </p:blipFill>
-        <p:spPr>
-          <a:xfrm>
-            <a:off x="4448152" y="1486253"/>
-            <a:ext cx="2462111" cy="1204210"/>
-          </a:xfrm>
-          <a:prstGeom prst="rect">
-            <a:avLst/>
-          </a:prstGeom>
-        </p:spPr>
-      </p:pic>
-      <p:sp>
-        <p:nvSpPr>
-          <p:cNvPr id="19" name="Oval 18">
-            <a:extLst>
-              <a:ext uri="{FF2B5EF4-FFF2-40B4-BE49-F238E27FC236}">
-                <a16:creationId xmlns:a16="http://schemas.microsoft.com/office/drawing/2014/main" id="{6FF725C5-2BC0-EF40-AB0F-DC49D043A755}"/>
-              </a:ext>
-            </a:extLst>
-          </p:cNvPr>
-          <p:cNvSpPr/>
-          <p:nvPr/>
-        </p:nvSpPr>
-        <p:spPr>
-          <a:xfrm>
-            <a:off x="2014926" y="5483891"/>
-            <a:ext cx="1082739" cy="1053994"/>
-          </a:xfrm>
-          <a:prstGeom prst="ellipse">
-            <a:avLst/>
-          </a:prstGeom>
-          <a:solidFill>
-            <a:schemeClr val="accent2">
-              <a:lumMod val="40000"/>
-              <a:lumOff val="60000"/>
-            </a:schemeClr>
-          </a:solidFill>
-        </p:spPr>
-        <p:style>
-          <a:lnRef idx="2">
-            <a:schemeClr val="accent1">
-              <a:shade val="15000"/>
-            </a:schemeClr>
-          </a:lnRef>
-          <a:fillRef idx="1">
-            <a:schemeClr val="accent1"/>
-          </a:fillRef>
-          <a:effectRef idx="0">
-            <a:schemeClr val="accent1"/>
-          </a:effectRef>
-          <a:fontRef idx="minor">
-            <a:schemeClr val="lt1"/>
-          </a:fontRef>
-        </p:style>
-        <p:txBody>
-          <a:bodyPr rtlCol="0" anchor="ctr"/>
-          <a:lstStyle/>
-          <a:p>
-            <a:pPr algn="ctr"/>
-            <a:r>
-              <a:rPr lang="en-US" dirty="0"/>
-              <a:t>Node</a:t>
-            </a:r>
-          </a:p>
-        </p:txBody>
-      </p:sp>
-      <p:sp>
-        <p:nvSpPr>
-          <p:cNvPr id="20" name="Oval 19">
-            <a:extLst>
-              <a:ext uri="{FF2B5EF4-FFF2-40B4-BE49-F238E27FC236}">
-                <a16:creationId xmlns:a16="http://schemas.microsoft.com/office/drawing/2014/main" id="{D3A7C955-0A1A-9D3F-D77E-3191B3B7788F}"/>
-              </a:ext>
-            </a:extLst>
-          </p:cNvPr>
-          <p:cNvSpPr/>
-          <p:nvPr/>
-        </p:nvSpPr>
-        <p:spPr>
-          <a:xfrm>
-            <a:off x="5240548" y="3456566"/>
-            <a:ext cx="1032593" cy="948906"/>
-          </a:xfrm>
-          <a:prstGeom prst="ellipse">
-            <a:avLst/>
-          </a:prstGeom>
-          <a:solidFill>
-            <a:schemeClr val="accent2">
-              <a:lumMod val="40000"/>
-              <a:lumOff val="60000"/>
-            </a:schemeClr>
-          </a:solidFill>
-        </p:spPr>
-        <p:style>
-          <a:lnRef idx="2">
-            <a:schemeClr val="accent1">
-              <a:shade val="15000"/>
-            </a:schemeClr>
-          </a:lnRef>
-          <a:fillRef idx="1">
-            <a:schemeClr val="accent1"/>
-          </a:fillRef>
-          <a:effectRef idx="0">
-            <a:schemeClr val="accent1"/>
-          </a:effectRef>
-          <a:fontRef idx="minor">
-            <a:schemeClr val="lt1"/>
-          </a:fontRef>
-        </p:style>
-        <p:txBody>
-          <a:bodyPr rtlCol="0" anchor="ctr"/>
-          <a:lstStyle/>
-          <a:p>
-            <a:pPr algn="ctr"/>
-            <a:r>
-              <a:rPr lang="en-US" dirty="0"/>
-              <a:t>Node</a:t>
-            </a:r>
-          </a:p>
-        </p:txBody>
-      </p:sp>
-      <p:sp>
-        <p:nvSpPr>
-          <p:cNvPr id="24" name="Rectangle 23">
-            <a:extLst>
-              <a:ext uri="{FF2B5EF4-FFF2-40B4-BE49-F238E27FC236}">
-                <a16:creationId xmlns:a16="http://schemas.microsoft.com/office/drawing/2014/main" id="{3EDA6DC7-D9D8-7EAB-54B2-23185E0E879D}"/>
-              </a:ext>
-            </a:extLst>
-          </p:cNvPr>
-          <p:cNvSpPr/>
-          <p:nvPr/>
-        </p:nvSpPr>
-        <p:spPr>
-          <a:xfrm>
-            <a:off x="9145364" y="2832816"/>
-            <a:ext cx="1535502" cy="1036608"/>
-          </a:xfrm>
-          <a:prstGeom prst="rect">
-            <a:avLst/>
-          </a:prstGeom>
-          <a:solidFill>
-            <a:schemeClr val="accent4"/>
-          </a:solidFill>
-        </p:spPr>
-        <p:style>
-          <a:lnRef idx="2">
-            <a:schemeClr val="accent1">
-              <a:shade val="15000"/>
-            </a:schemeClr>
-          </a:lnRef>
-          <a:fillRef idx="1">
-            <a:schemeClr val="accent1"/>
-          </a:fillRef>
-          <a:effectRef idx="0">
-            <a:schemeClr val="accent1"/>
-          </a:effectRef>
-          <a:fontRef idx="minor">
-            <a:schemeClr val="lt1"/>
-          </a:fontRef>
-        </p:style>
-        <p:txBody>
-          <a:bodyPr rtlCol="0" anchor="ctr"/>
-          <a:lstStyle/>
-          <a:p>
-            <a:pPr algn="ctr"/>
-            <a:r>
-              <a:rPr lang="en-US" dirty="0"/>
-              <a:t>Total Weight</a:t>
-            </a:r>
-          </a:p>
-        </p:txBody>
-      </p:sp>
-      <p:sp>
-        <p:nvSpPr>
-          <p:cNvPr id="25" name="Oval 24">
-            <a:extLst>
-              <a:ext uri="{FF2B5EF4-FFF2-40B4-BE49-F238E27FC236}">
-                <a16:creationId xmlns:a16="http://schemas.microsoft.com/office/drawing/2014/main" id="{596A05D3-6761-FFEB-E60E-ADCBB5C207C5}"/>
-              </a:ext>
-            </a:extLst>
-          </p:cNvPr>
-          <p:cNvSpPr/>
-          <p:nvPr/>
-        </p:nvSpPr>
-        <p:spPr>
-          <a:xfrm>
-            <a:off x="3272440" y="3931019"/>
-            <a:ext cx="1032593" cy="948906"/>
-          </a:xfrm>
-          <a:prstGeom prst="ellipse">
-            <a:avLst/>
-          </a:prstGeom>
-          <a:solidFill>
-            <a:schemeClr val="accent2">
-              <a:lumMod val="40000"/>
-              <a:lumOff val="60000"/>
-            </a:schemeClr>
-          </a:solidFill>
-        </p:spPr>
-        <p:style>
-          <a:lnRef idx="2">
-            <a:schemeClr val="accent1">
-              <a:shade val="15000"/>
-            </a:schemeClr>
-          </a:lnRef>
-          <a:fillRef idx="1">
-            <a:schemeClr val="accent1"/>
-          </a:fillRef>
-          <a:effectRef idx="0">
-            <a:schemeClr val="accent1"/>
-          </a:effectRef>
-          <a:fontRef idx="minor">
-            <a:schemeClr val="lt1"/>
-          </a:fontRef>
-        </p:style>
-        <p:txBody>
-          <a:bodyPr rtlCol="0" anchor="ctr"/>
-          <a:lstStyle/>
-          <a:p>
-            <a:pPr algn="ctr"/>
-            <a:r>
-              <a:rPr lang="en-US" dirty="0"/>
-              <a:t>Node</a:t>
-            </a:r>
-          </a:p>
-        </p:txBody>
-      </p:sp>
-      <p:sp>
-        <p:nvSpPr>
-          <p:cNvPr id="26" name="Oval 25">
-            <a:extLst>
-              <a:ext uri="{FF2B5EF4-FFF2-40B4-BE49-F238E27FC236}">
-                <a16:creationId xmlns:a16="http://schemas.microsoft.com/office/drawing/2014/main" id="{5B1D353B-D074-58B9-867D-7D4F98691E94}"/>
-              </a:ext>
-            </a:extLst>
-          </p:cNvPr>
-          <p:cNvSpPr/>
-          <p:nvPr/>
-        </p:nvSpPr>
-        <p:spPr>
-          <a:xfrm>
-            <a:off x="7140563" y="4313228"/>
-            <a:ext cx="1032593" cy="948906"/>
-          </a:xfrm>
-          <a:prstGeom prst="ellipse">
-            <a:avLst/>
-          </a:prstGeom>
-          <a:solidFill>
-            <a:schemeClr val="accent2">
-              <a:lumMod val="40000"/>
-              <a:lumOff val="60000"/>
-            </a:schemeClr>
-          </a:solidFill>
-        </p:spPr>
-        <p:style>
-          <a:lnRef idx="2">
-            <a:schemeClr val="accent1">
-              <a:shade val="15000"/>
-            </a:schemeClr>
-          </a:lnRef>
-          <a:fillRef idx="1">
-            <a:schemeClr val="accent1"/>
-          </a:fillRef>
-          <a:effectRef idx="0">
-            <a:schemeClr val="accent1"/>
-          </a:effectRef>
-          <a:fontRef idx="minor">
-            <a:schemeClr val="lt1"/>
-          </a:fontRef>
-        </p:style>
-        <p:txBody>
-          <a:bodyPr rtlCol="0" anchor="ctr"/>
-          <a:lstStyle/>
-          <a:p>
-            <a:pPr algn="ctr"/>
-            <a:r>
-              <a:rPr lang="en-US" dirty="0"/>
-              <a:t>Node</a:t>
-            </a:r>
-          </a:p>
-        </p:txBody>
-      </p:sp>
-      <p:sp>
-        <p:nvSpPr>
-          <p:cNvPr id="27" name="Oval 26">
-            <a:extLst>
-              <a:ext uri="{FF2B5EF4-FFF2-40B4-BE49-F238E27FC236}">
-                <a16:creationId xmlns:a16="http://schemas.microsoft.com/office/drawing/2014/main" id="{FF3BAD84-C2FB-41A2-49BF-99BBEB434D0D}"/>
-              </a:ext>
-            </a:extLst>
-          </p:cNvPr>
-          <p:cNvSpPr/>
-          <p:nvPr/>
-        </p:nvSpPr>
-        <p:spPr>
-          <a:xfrm>
-            <a:off x="8173156" y="5637778"/>
-            <a:ext cx="1032593" cy="948906"/>
-          </a:xfrm>
-          <a:prstGeom prst="ellipse">
-            <a:avLst/>
-          </a:prstGeom>
-          <a:solidFill>
-            <a:schemeClr val="accent2">
-              <a:lumMod val="40000"/>
-              <a:lumOff val="60000"/>
-            </a:schemeClr>
-          </a:solidFill>
-        </p:spPr>
-        <p:style>
-          <a:lnRef idx="2">
-            <a:schemeClr val="accent1">
-              <a:shade val="15000"/>
-            </a:schemeClr>
-          </a:lnRef>
-          <a:fillRef idx="1">
-            <a:schemeClr val="accent1"/>
-          </a:fillRef>
-          <a:effectRef idx="0">
-            <a:schemeClr val="accent1"/>
-          </a:effectRef>
-          <a:fontRef idx="minor">
-            <a:schemeClr val="lt1"/>
-          </a:fontRef>
-        </p:style>
-        <p:txBody>
-          <a:bodyPr rtlCol="0" anchor="ctr"/>
-          <a:lstStyle/>
-          <a:p>
-            <a:pPr algn="ctr"/>
-            <a:r>
-              <a:rPr lang="en-US" dirty="0"/>
-              <a:t>Node</a:t>
-            </a:r>
-          </a:p>
-        </p:txBody>
-      </p:sp>
-      <p:sp>
-        <p:nvSpPr>
-          <p:cNvPr id="29" name="TextBox 28">
-            <a:extLst>
-              <a:ext uri="{FF2B5EF4-FFF2-40B4-BE49-F238E27FC236}">
-                <a16:creationId xmlns:a16="http://schemas.microsoft.com/office/drawing/2014/main" id="{407218EA-1952-9294-575D-BABEA1904CF0}"/>
-              </a:ext>
-            </a:extLst>
-          </p:cNvPr>
-          <p:cNvSpPr txBox="1"/>
-          <p:nvPr/>
-        </p:nvSpPr>
-        <p:spPr>
-          <a:xfrm>
-            <a:off x="4251534" y="5299225"/>
-            <a:ext cx="3400095" cy="369332"/>
-          </a:xfrm>
-          <a:prstGeom prst="rect">
-            <a:avLst/>
-          </a:prstGeom>
-          <a:noFill/>
-        </p:spPr>
-        <p:txBody>
-          <a:bodyPr wrap="square" rtlCol="0">
-            <a:spAutoFit/>
-          </a:bodyPr>
-          <a:lstStyle/>
-          <a:p>
-            <a:r>
-              <a:rPr lang="en-US" dirty="0"/>
-              <a:t>We Found A path To our Goal !</a:t>
-            </a:r>
-          </a:p>
-        </p:txBody>
-      </p:sp>
-      <p:sp>
-        <p:nvSpPr>
-          <p:cNvPr id="30" name="Smiley Face 29">
-            <a:extLst>
-              <a:ext uri="{FF2B5EF4-FFF2-40B4-BE49-F238E27FC236}">
-                <a16:creationId xmlns:a16="http://schemas.microsoft.com/office/drawing/2014/main" id="{ECA7C8AB-4B51-10B5-605E-40F6394200C1}"/>
-              </a:ext>
-            </a:extLst>
-          </p:cNvPr>
-          <p:cNvSpPr/>
-          <p:nvPr/>
-        </p:nvSpPr>
-        <p:spPr>
-          <a:xfrm>
-            <a:off x="5295841" y="5637949"/>
-            <a:ext cx="978860" cy="970696"/>
-          </a:xfrm>
-          <a:prstGeom prst="smileyFace">
-            <a:avLst/>
-          </a:prstGeom>
-          <a:solidFill>
-            <a:schemeClr val="accent4">
-              <a:lumMod val="40000"/>
-              <a:lumOff val="60000"/>
-            </a:schemeClr>
-          </a:solidFill>
-        </p:spPr>
-        <p:style>
-          <a:lnRef idx="2">
-            <a:schemeClr val="accent1">
-              <a:shade val="15000"/>
-            </a:schemeClr>
-          </a:lnRef>
-          <a:fillRef idx="1">
-            <a:schemeClr val="accent1"/>
-          </a:fillRef>
-          <a:effectRef idx="0">
-            <a:schemeClr val="accent1"/>
-          </a:effectRef>
-          <a:fontRef idx="minor">
-            <a:schemeClr val="lt1"/>
-          </a:fontRef>
-        </p:style>
-        <p:txBody>
-          <a:bodyPr rtlCol="0" anchor="ctr"/>
-          <a:lstStyle/>
-          <a:p>
-            <a:pPr algn="ctr"/>
-            <a:endParaRPr lang="en-US"/>
-          </a:p>
-        </p:txBody>
-      </p:sp>
-    </p:spTree>
-    <p:extLst>
-      <p:ext uri="{BB962C8B-B14F-4D97-AF65-F5344CB8AC3E}">
-        <p14:creationId xmlns:p14="http://schemas.microsoft.com/office/powerpoint/2010/main" val="747437849"/>
-      </p:ext>
-    </p:extLst>
-  </p:cSld>
-  <p:clrMapOvr>
-    <a:masterClrMapping/>
-  </p:clrMapOvr>
-</p:sld>
-</file>
-
-<file path=ppt/slides/slide25.xml><?xml version="1.0" encoding="utf-8"?>
-<p:sld xmlns:a="http://schemas.openxmlformats.org/drawingml/2006/main" xmlns:r="http://schemas.openxmlformats.org/officeDocument/2006/relationships" xmlns:p="http://schemas.openxmlformats.org/presentationml/2006/main">
-  <p:cSld>
-    <p:spTree>
-      <p:nvGrpSpPr>
-        <p:cNvPr id="1" name="">
-          <a:extLst>
-            <a:ext uri="{FF2B5EF4-FFF2-40B4-BE49-F238E27FC236}">
               <a16:creationId xmlns:a16="http://schemas.microsoft.com/office/drawing/2014/main" id="{6428A4AD-ADDA-4100-1BEE-7D4801486C27}"/>
             </a:ext>
           </a:extLst>
@@ -29407,7 +28994,7 @@
         </p:blipFill>
         <p:spPr>
           <a:xfrm>
-            <a:off x="3089873" y="304251"/>
+            <a:off x="788235" y="2409086"/>
             <a:ext cx="6200775" cy="1819275"/>
           </a:xfrm>
           <a:prstGeom prst="rect">
@@ -29415,66 +29002,94 @@
           </a:prstGeom>
         </p:spPr>
       </p:pic>
-      <p:pic>
-        <p:nvPicPr>
-          <p:cNvPr id="5" name="Picture 4">
+      <p:sp>
+        <p:nvSpPr>
+          <p:cNvPr id="11" name="Rectangle 10">
             <a:extLst>
               <a:ext uri="{FF2B5EF4-FFF2-40B4-BE49-F238E27FC236}">
-                <a16:creationId xmlns:a16="http://schemas.microsoft.com/office/drawing/2014/main" id="{EC54C57F-2F62-CCCD-65F7-7028891E0F3B}"/>
+                <a16:creationId xmlns:a16="http://schemas.microsoft.com/office/drawing/2014/main" id="{50B43F5D-26E8-CAD6-302D-1F08EF6EB5DD}"/>
               </a:ext>
             </a:extLst>
           </p:cNvPr>
-          <p:cNvPicPr>
-            <a:picLocks noChangeAspect="1"/>
-          </p:cNvPicPr>
+          <p:cNvSpPr/>
           <p:nvPr/>
-        </p:nvPicPr>
-        <p:blipFill>
-          <a:blip r:embed="rId3"/>
-          <a:stretch>
-            <a:fillRect/>
-          </a:stretch>
-        </p:blipFill>
+        </p:nvSpPr>
         <p:spPr>
           <a:xfrm>
-            <a:off x="2800079" y="2318106"/>
-            <a:ext cx="7023808" cy="3414157"/>
+            <a:off x="7927300" y="3035427"/>
+            <a:ext cx="2878537" cy="1579463"/>
           </a:xfrm>
           <a:prstGeom prst="rect">
             <a:avLst/>
           </a:prstGeom>
+          <a:solidFill>
+            <a:schemeClr val="accent4"/>
+          </a:solidFill>
         </p:spPr>
-      </p:pic>
-      <p:pic>
-        <p:nvPicPr>
-          <p:cNvPr id="8" name="Picture 7">
+        <p:style>
+          <a:lnRef idx="2">
+            <a:schemeClr val="accent1">
+              <a:shade val="15000"/>
+            </a:schemeClr>
+          </a:lnRef>
+          <a:fillRef idx="1">
+            <a:schemeClr val="accent1"/>
+          </a:fillRef>
+          <a:effectRef idx="0">
+            <a:schemeClr val="accent1"/>
+          </a:effectRef>
+          <a:fontRef idx="minor">
+            <a:schemeClr val="lt1"/>
+          </a:fontRef>
+        </p:style>
+        <p:txBody>
+          <a:bodyPr rtlCol="0" anchor="ctr"/>
+          <a:lstStyle/>
+          <a:p>
+            <a:pPr algn="ctr"/>
+            <a:r>
+              <a:rPr lang="en-US" dirty="0"/>
+              <a:t>Total Weight</a:t>
+            </a:r>
+          </a:p>
+        </p:txBody>
+      </p:sp>
+      <p:sp>
+        <p:nvSpPr>
+          <p:cNvPr id="12" name="TextBox 11">
             <a:extLst>
               <a:ext uri="{FF2B5EF4-FFF2-40B4-BE49-F238E27FC236}">
-                <a16:creationId xmlns:a16="http://schemas.microsoft.com/office/drawing/2014/main" id="{B89DD856-885B-0DD5-275B-4CC007E7321B}"/>
+                <a16:creationId xmlns:a16="http://schemas.microsoft.com/office/drawing/2014/main" id="{BD9F74B2-1DF7-4F8D-39DC-DD8D0EA3F62B}"/>
               </a:ext>
             </a:extLst>
           </p:cNvPr>
-          <p:cNvPicPr>
-            <a:picLocks noChangeAspect="1"/>
-          </p:cNvPicPr>
+          <p:cNvSpPr txBox="1"/>
           <p:nvPr/>
-        </p:nvPicPr>
-        <p:blipFill>
-          <a:blip r:embed="rId4"/>
-          <a:stretch>
-            <a:fillRect/>
-          </a:stretch>
-        </p:blipFill>
+        </p:nvSpPr>
         <p:spPr>
           <a:xfrm>
-            <a:off x="3089873" y="6111725"/>
-            <a:ext cx="3886200" cy="276225"/>
+            <a:off x="3401159" y="515998"/>
+            <a:ext cx="5638065" cy="769441"/>
           </a:xfrm>
           <a:prstGeom prst="rect">
             <a:avLst/>
           </a:prstGeom>
+          <a:noFill/>
         </p:spPr>
-      </p:pic>
+        <p:txBody>
+          <a:bodyPr wrap="square">
+            <a:spAutoFit/>
+          </a:bodyPr>
+          <a:lstStyle/>
+          <a:p>
+            <a:r>
+              <a:rPr lang="en-US" sz="4400" b="1" dirty="0"/>
+              <a:t>Calculate Total Weight</a:t>
+            </a:r>
+            <a:endParaRPr lang="en-BE" sz="4400" b="1" dirty="0"/>
+          </a:p>
+        </p:txBody>
+      </p:sp>
     </p:spTree>
     <p:extLst>
       <p:ext uri="{BB962C8B-B14F-4D97-AF65-F5344CB8AC3E}">
@@ -29488,210 +29103,7 @@
 </p:sld>
 </file>
 
-<file path=ppt/slides/slide26.xml><?xml version="1.0" encoding="utf-8"?>
-<p:sld xmlns:a="http://schemas.openxmlformats.org/drawingml/2006/main" xmlns:r="http://schemas.openxmlformats.org/officeDocument/2006/relationships" xmlns:p="http://schemas.openxmlformats.org/presentationml/2006/main">
-  <p:cSld>
-    <p:spTree>
-      <p:nvGrpSpPr>
-        <p:cNvPr id="1" name="">
-          <a:extLst>
-            <a:ext uri="{FF2B5EF4-FFF2-40B4-BE49-F238E27FC236}">
-              <a16:creationId xmlns:a16="http://schemas.microsoft.com/office/drawing/2014/main" id="{E570B693-E634-43CC-95EE-89143643271F}"/>
-            </a:ext>
-          </a:extLst>
-        </p:cNvPr>
-        <p:cNvGrpSpPr/>
-        <p:nvPr/>
-      </p:nvGrpSpPr>
-      <p:grpSpPr>
-        <a:xfrm>
-          <a:off x="0" y="0"/>
-          <a:ext cx="0" cy="0"/>
-          <a:chOff x="0" y="0"/>
-          <a:chExt cx="0" cy="0"/>
-        </a:xfrm>
-      </p:grpSpPr>
-      <p:sp>
-        <p:nvSpPr>
-          <p:cNvPr id="9" name="Tekstvak 8">
-            <a:extLst>
-              <a:ext uri="{FF2B5EF4-FFF2-40B4-BE49-F238E27FC236}">
-                <a16:creationId xmlns:a16="http://schemas.microsoft.com/office/drawing/2014/main" id="{491A8674-0D3D-DA09-ABBC-75EDCB286FE0}"/>
-              </a:ext>
-            </a:extLst>
-          </p:cNvPr>
-          <p:cNvSpPr txBox="1"/>
-          <p:nvPr/>
-        </p:nvSpPr>
-        <p:spPr>
-          <a:xfrm>
-            <a:off x="-272288" y="2409086"/>
-            <a:ext cx="3520440" cy="423730"/>
-          </a:xfrm>
-          <a:prstGeom prst="rect">
-            <a:avLst/>
-          </a:prstGeom>
-          <a:noFill/>
-        </p:spPr>
-        <p:txBody>
-          <a:bodyPr wrap="square" rtlCol="0">
-            <a:spAutoFit/>
-          </a:bodyPr>
-          <a:lstStyle/>
-          <a:p>
-            <a:endParaRPr lang="nl-NL" dirty="0"/>
-          </a:p>
-        </p:txBody>
-      </p:sp>
-      <p:sp>
-        <p:nvSpPr>
-          <p:cNvPr id="10" name="AutoShape 2">
-            <a:extLst>
-              <a:ext uri="{FF2B5EF4-FFF2-40B4-BE49-F238E27FC236}">
-                <a16:creationId xmlns:a16="http://schemas.microsoft.com/office/drawing/2014/main" id="{AFDD239A-2D0F-A062-05B1-D9A6A503E08C}"/>
-              </a:ext>
-            </a:extLst>
-          </p:cNvPr>
-          <p:cNvSpPr>
-            <a:spLocks noChangeAspect="1" noChangeArrowheads="1"/>
-          </p:cNvSpPr>
-          <p:nvPr/>
-        </p:nvSpPr>
-        <p:spPr bwMode="auto">
-          <a:xfrm>
-            <a:off x="5943599" y="18691"/>
-            <a:ext cx="3562709" cy="3562709"/>
-          </a:xfrm>
-          <a:prstGeom prst="rect">
-            <a:avLst/>
-          </a:prstGeom>
-          <a:noFill/>
-          <a:extLst>
-            <a:ext uri="{909E8E84-426E-40DD-AFC4-6F175D3DCCD1}">
-              <a14:hiddenFill xmlns:a14="http://schemas.microsoft.com/office/drawing/2010/main">
-                <a:solidFill>
-                  <a:srgbClr val="FFFFFF"/>
-                </a:solidFill>
-              </a14:hiddenFill>
-            </a:ext>
-          </a:extLst>
-        </p:spPr>
-        <p:txBody>
-          <a:bodyPr vert="horz" wrap="square" lIns="91440" tIns="45720" rIns="91440" bIns="45720" numCol="1" anchor="t" anchorCtr="0" compatLnSpc="1">
-            <a:prstTxWarp prst="textNoShape">
-              <a:avLst/>
-            </a:prstTxWarp>
-          </a:bodyPr>
-          <a:lstStyle/>
-          <a:p>
-            <a:endParaRPr lang="en-US"/>
-          </a:p>
-        </p:txBody>
-      </p:sp>
-      <p:pic>
-        <p:nvPicPr>
-          <p:cNvPr id="3" name="Picture 2">
-            <a:extLst>
-              <a:ext uri="{FF2B5EF4-FFF2-40B4-BE49-F238E27FC236}">
-                <a16:creationId xmlns:a16="http://schemas.microsoft.com/office/drawing/2014/main" id="{E89C61D4-E432-D5F7-9FA9-9F2D50F51930}"/>
-              </a:ext>
-            </a:extLst>
-          </p:cNvPr>
-          <p:cNvPicPr>
-            <a:picLocks noChangeAspect="1"/>
-          </p:cNvPicPr>
-          <p:nvPr/>
-        </p:nvPicPr>
-        <p:blipFill>
-          <a:blip r:embed="rId2"/>
-          <a:stretch>
-            <a:fillRect/>
-          </a:stretch>
-        </p:blipFill>
-        <p:spPr>
-          <a:xfrm>
-            <a:off x="3089873" y="304251"/>
-            <a:ext cx="6200775" cy="1819275"/>
-          </a:xfrm>
-          <a:prstGeom prst="rect">
-            <a:avLst/>
-          </a:prstGeom>
-        </p:spPr>
-      </p:pic>
-      <p:pic>
-        <p:nvPicPr>
-          <p:cNvPr id="5" name="Picture 4">
-            <a:extLst>
-              <a:ext uri="{FF2B5EF4-FFF2-40B4-BE49-F238E27FC236}">
-                <a16:creationId xmlns:a16="http://schemas.microsoft.com/office/drawing/2014/main" id="{FD225C55-4192-5F2F-6ED1-C829109B3DF1}"/>
-              </a:ext>
-            </a:extLst>
-          </p:cNvPr>
-          <p:cNvPicPr>
-            <a:picLocks noChangeAspect="1"/>
-          </p:cNvPicPr>
-          <p:nvPr/>
-        </p:nvPicPr>
-        <p:blipFill>
-          <a:blip r:embed="rId3"/>
-          <a:stretch>
-            <a:fillRect/>
-          </a:stretch>
-        </p:blipFill>
-        <p:spPr>
-          <a:xfrm>
-            <a:off x="2800079" y="2318106"/>
-            <a:ext cx="7023808" cy="3414157"/>
-          </a:xfrm>
-          <a:prstGeom prst="rect">
-            <a:avLst/>
-          </a:prstGeom>
-        </p:spPr>
-      </p:pic>
-      <p:pic>
-        <p:nvPicPr>
-          <p:cNvPr id="8" name="Picture 7">
-            <a:extLst>
-              <a:ext uri="{FF2B5EF4-FFF2-40B4-BE49-F238E27FC236}">
-                <a16:creationId xmlns:a16="http://schemas.microsoft.com/office/drawing/2014/main" id="{FEC03B4D-311D-E5B5-1E25-43C6BB16758B}"/>
-              </a:ext>
-            </a:extLst>
-          </p:cNvPr>
-          <p:cNvPicPr>
-            <a:picLocks noChangeAspect="1"/>
-          </p:cNvPicPr>
-          <p:nvPr/>
-        </p:nvPicPr>
-        <p:blipFill>
-          <a:blip r:embed="rId4"/>
-          <a:stretch>
-            <a:fillRect/>
-          </a:stretch>
-        </p:blipFill>
-        <p:spPr>
-          <a:xfrm>
-            <a:off x="3089873" y="6111725"/>
-            <a:ext cx="3886200" cy="276225"/>
-          </a:xfrm>
-          <a:prstGeom prst="rect">
-            <a:avLst/>
-          </a:prstGeom>
-        </p:spPr>
-      </p:pic>
-    </p:spTree>
-    <p:extLst>
-      <p:ext uri="{BB962C8B-B14F-4D97-AF65-F5344CB8AC3E}">
-        <p14:creationId xmlns:p14="http://schemas.microsoft.com/office/powerpoint/2010/main" val="37548969"/>
-      </p:ext>
-    </p:extLst>
-  </p:cSld>
-  <p:clrMapOvr>
-    <a:masterClrMapping/>
-  </p:clrMapOvr>
-</p:sld>
-</file>
-
-<file path=ppt/slides/slide27.xml><?xml version="1.0" encoding="utf-8"?>
+<file path=ppt/slides/slide25.xml><?xml version="1.0" encoding="utf-8"?>
 <p:sld xmlns:a="http://schemas.openxmlformats.org/drawingml/2006/main" xmlns:r="http://schemas.openxmlformats.org/officeDocument/2006/relationships" xmlns:p="http://schemas.openxmlformats.org/presentationml/2006/main">
   <p:cSld>
     <p:spTree>
@@ -29927,6 +29339,36 @@
           </a:p>
         </p:txBody>
       </p:sp>
+      <p:pic>
+        <p:nvPicPr>
+          <p:cNvPr id="13" name="Picture 12">
+            <a:extLst>
+              <a:ext uri="{FF2B5EF4-FFF2-40B4-BE49-F238E27FC236}">
+                <a16:creationId xmlns:a16="http://schemas.microsoft.com/office/drawing/2014/main" id="{7BEF48F5-BDEB-062D-7D1D-9BC9095B8C7C}"/>
+              </a:ext>
+            </a:extLst>
+          </p:cNvPr>
+          <p:cNvPicPr>
+            <a:picLocks noChangeAspect="1"/>
+          </p:cNvPicPr>
+          <p:nvPr/>
+        </p:nvPicPr>
+        <p:blipFill>
+          <a:blip r:embed="rId2"/>
+          <a:stretch>
+            <a:fillRect/>
+          </a:stretch>
+        </p:blipFill>
+        <p:spPr>
+          <a:xfrm>
+            <a:off x="2833038" y="4305300"/>
+            <a:ext cx="6163184" cy="2115720"/>
+          </a:xfrm>
+          <a:prstGeom prst="rect">
+            <a:avLst/>
+          </a:prstGeom>
+        </p:spPr>
+      </p:pic>
     </p:spTree>
     <p:extLst>
       <p:ext uri="{BB962C8B-B14F-4D97-AF65-F5344CB8AC3E}">
@@ -29940,7 +29382,427 @@
 </p:sld>
 </file>
 
-<file path=ppt/slides/slide28.xml><?xml version="1.0" encoding="utf-8"?>
+<file path=ppt/slides/slide26.xml><?xml version="1.0" encoding="utf-8"?>
+<p:sld xmlns:a="http://schemas.openxmlformats.org/drawingml/2006/main" xmlns:r="http://schemas.openxmlformats.org/officeDocument/2006/relationships" xmlns:p="http://schemas.openxmlformats.org/presentationml/2006/main">
+  <p:cSld>
+    <p:spTree>
+      <p:nvGrpSpPr>
+        <p:cNvPr id="1" name="">
+          <a:extLst>
+            <a:ext uri="{FF2B5EF4-FFF2-40B4-BE49-F238E27FC236}">
+              <a16:creationId xmlns:a16="http://schemas.microsoft.com/office/drawing/2014/main" id="{D42181B8-366B-F67F-5074-7277EB8E3026}"/>
+            </a:ext>
+          </a:extLst>
+        </p:cNvPr>
+        <p:cNvGrpSpPr/>
+        <p:nvPr/>
+      </p:nvGrpSpPr>
+      <p:grpSpPr>
+        <a:xfrm>
+          <a:off x="0" y="0"/>
+          <a:ext cx="0" cy="0"/>
+          <a:chOff x="0" y="0"/>
+          <a:chExt cx="0" cy="0"/>
+        </a:xfrm>
+      </p:grpSpPr>
+      <p:sp>
+        <p:nvSpPr>
+          <p:cNvPr id="9" name="Tekstvak 8">
+            <a:extLst>
+              <a:ext uri="{FF2B5EF4-FFF2-40B4-BE49-F238E27FC236}">
+                <a16:creationId xmlns:a16="http://schemas.microsoft.com/office/drawing/2014/main" id="{DDFA8915-1544-DE52-8AB2-7FE64E98CB8D}"/>
+              </a:ext>
+            </a:extLst>
+          </p:cNvPr>
+          <p:cNvSpPr txBox="1"/>
+          <p:nvPr/>
+        </p:nvSpPr>
+        <p:spPr>
+          <a:xfrm>
+            <a:off x="-272288" y="2409086"/>
+            <a:ext cx="3520440" cy="423730"/>
+          </a:xfrm>
+          <a:prstGeom prst="rect">
+            <a:avLst/>
+          </a:prstGeom>
+          <a:noFill/>
+        </p:spPr>
+        <p:txBody>
+          <a:bodyPr wrap="square" rtlCol="0">
+            <a:spAutoFit/>
+          </a:bodyPr>
+          <a:lstStyle/>
+          <a:p>
+            <a:endParaRPr lang="nl-NL" dirty="0"/>
+          </a:p>
+        </p:txBody>
+      </p:sp>
+      <p:sp>
+        <p:nvSpPr>
+          <p:cNvPr id="10" name="AutoShape 2">
+            <a:extLst>
+              <a:ext uri="{FF2B5EF4-FFF2-40B4-BE49-F238E27FC236}">
+                <a16:creationId xmlns:a16="http://schemas.microsoft.com/office/drawing/2014/main" id="{885D89F0-FD58-E0EB-9532-6887187BABB3}"/>
+              </a:ext>
+            </a:extLst>
+          </p:cNvPr>
+          <p:cNvSpPr>
+            <a:spLocks noChangeAspect="1" noChangeArrowheads="1"/>
+          </p:cNvSpPr>
+          <p:nvPr/>
+        </p:nvSpPr>
+        <p:spPr bwMode="auto">
+          <a:xfrm>
+            <a:off x="5943599" y="18691"/>
+            <a:ext cx="3562709" cy="3562709"/>
+          </a:xfrm>
+          <a:prstGeom prst="rect">
+            <a:avLst/>
+          </a:prstGeom>
+          <a:noFill/>
+          <a:extLst>
+            <a:ext uri="{909E8E84-426E-40DD-AFC4-6F175D3DCCD1}">
+              <a14:hiddenFill xmlns:a14="http://schemas.microsoft.com/office/drawing/2010/main">
+                <a:solidFill>
+                  <a:srgbClr val="FFFFFF"/>
+                </a:solidFill>
+              </a14:hiddenFill>
+            </a:ext>
+          </a:extLst>
+        </p:spPr>
+        <p:txBody>
+          <a:bodyPr vert="horz" wrap="square" lIns="91440" tIns="45720" rIns="91440" bIns="45720" numCol="1" anchor="t" anchorCtr="0" compatLnSpc="1">
+            <a:prstTxWarp prst="textNoShape">
+              <a:avLst/>
+            </a:prstTxWarp>
+          </a:bodyPr>
+          <a:lstStyle/>
+          <a:p>
+            <a:endParaRPr lang="en-US"/>
+          </a:p>
+        </p:txBody>
+      </p:sp>
+      <p:pic>
+        <p:nvPicPr>
+          <p:cNvPr id="3" name="Picture 2">
+            <a:extLst>
+              <a:ext uri="{FF2B5EF4-FFF2-40B4-BE49-F238E27FC236}">
+                <a16:creationId xmlns:a16="http://schemas.microsoft.com/office/drawing/2014/main" id="{B2F62852-7E49-97FE-3E9E-B67AAA7D779A}"/>
+              </a:ext>
+            </a:extLst>
+          </p:cNvPr>
+          <p:cNvPicPr>
+            <a:picLocks noChangeAspect="1"/>
+          </p:cNvPicPr>
+          <p:nvPr/>
+        </p:nvPicPr>
+        <p:blipFill>
+          <a:blip r:embed="rId2"/>
+          <a:stretch>
+            <a:fillRect/>
+          </a:stretch>
+        </p:blipFill>
+        <p:spPr>
+          <a:xfrm>
+            <a:off x="2133600" y="4301505"/>
+            <a:ext cx="7924800" cy="628650"/>
+          </a:xfrm>
+          <a:prstGeom prst="rect">
+            <a:avLst/>
+          </a:prstGeom>
+        </p:spPr>
+      </p:pic>
+      <p:sp>
+        <p:nvSpPr>
+          <p:cNvPr id="6" name="TextBox 5">
+            <a:extLst>
+              <a:ext uri="{FF2B5EF4-FFF2-40B4-BE49-F238E27FC236}">
+                <a16:creationId xmlns:a16="http://schemas.microsoft.com/office/drawing/2014/main" id="{5C81BFE6-C980-1A51-1C55-B59A4C840483}"/>
+              </a:ext>
+            </a:extLst>
+          </p:cNvPr>
+          <p:cNvSpPr txBox="1"/>
+          <p:nvPr/>
+        </p:nvSpPr>
+        <p:spPr>
+          <a:xfrm>
+            <a:off x="3319223" y="5232640"/>
+            <a:ext cx="3804249" cy="646331"/>
+          </a:xfrm>
+          <a:prstGeom prst="rect">
+            <a:avLst/>
+          </a:prstGeom>
+          <a:noFill/>
+        </p:spPr>
+        <p:txBody>
+          <a:bodyPr wrap="square" rtlCol="0">
+            <a:spAutoFit/>
+          </a:bodyPr>
+          <a:lstStyle/>
+          <a:p>
+            <a:r>
+              <a:rPr lang="en-US" dirty="0"/>
+              <a:t>This Add one effect on the world that meets next action preconditions</a:t>
+            </a:r>
+          </a:p>
+        </p:txBody>
+      </p:sp>
+      <p:sp>
+        <p:nvSpPr>
+          <p:cNvPr id="8" name="Oval 7">
+            <a:extLst>
+              <a:ext uri="{FF2B5EF4-FFF2-40B4-BE49-F238E27FC236}">
+                <a16:creationId xmlns:a16="http://schemas.microsoft.com/office/drawing/2014/main" id="{A04C7BA6-73C4-2072-52FF-6DD0EF6BD3F0}"/>
+              </a:ext>
+            </a:extLst>
+          </p:cNvPr>
+          <p:cNvSpPr/>
+          <p:nvPr/>
+        </p:nvSpPr>
+        <p:spPr>
+          <a:xfrm>
+            <a:off x="2575253" y="2531188"/>
+            <a:ext cx="1159595" cy="918438"/>
+          </a:xfrm>
+          <a:prstGeom prst="ellipse">
+            <a:avLst/>
+          </a:prstGeom>
+          <a:solidFill>
+            <a:schemeClr val="accent5">
+              <a:lumMod val="60000"/>
+              <a:lumOff val="40000"/>
+            </a:schemeClr>
+          </a:solidFill>
+        </p:spPr>
+        <p:style>
+          <a:lnRef idx="2">
+            <a:schemeClr val="accent1">
+              <a:shade val="15000"/>
+            </a:schemeClr>
+          </a:lnRef>
+          <a:fillRef idx="1">
+            <a:schemeClr val="accent1"/>
+          </a:fillRef>
+          <a:effectRef idx="0">
+            <a:schemeClr val="accent1"/>
+          </a:effectRef>
+          <a:fontRef idx="minor">
+            <a:schemeClr val="lt1"/>
+          </a:fontRef>
+        </p:style>
+        <p:txBody>
+          <a:bodyPr rtlCol="0" anchor="ctr"/>
+          <a:lstStyle/>
+          <a:p>
+            <a:pPr algn="ctr"/>
+            <a:r>
+              <a:rPr lang="en-US" dirty="0"/>
+              <a:t>Go To Food</a:t>
+            </a:r>
+          </a:p>
+        </p:txBody>
+      </p:sp>
+      <p:sp>
+        <p:nvSpPr>
+          <p:cNvPr id="11" name="Oval 10">
+            <a:extLst>
+              <a:ext uri="{FF2B5EF4-FFF2-40B4-BE49-F238E27FC236}">
+                <a16:creationId xmlns:a16="http://schemas.microsoft.com/office/drawing/2014/main" id="{049BA649-5F5E-2970-BE55-BA67862B486B}"/>
+              </a:ext>
+            </a:extLst>
+          </p:cNvPr>
+          <p:cNvSpPr/>
+          <p:nvPr/>
+        </p:nvSpPr>
+        <p:spPr>
+          <a:xfrm>
+            <a:off x="7583179" y="2407643"/>
+            <a:ext cx="1309059" cy="981794"/>
+          </a:xfrm>
+          <a:prstGeom prst="ellipse">
+            <a:avLst/>
+          </a:prstGeom>
+          <a:solidFill>
+            <a:schemeClr val="accent5">
+              <a:lumMod val="60000"/>
+              <a:lumOff val="40000"/>
+            </a:schemeClr>
+          </a:solidFill>
+        </p:spPr>
+        <p:style>
+          <a:lnRef idx="2">
+            <a:schemeClr val="accent1">
+              <a:shade val="15000"/>
+            </a:schemeClr>
+          </a:lnRef>
+          <a:fillRef idx="1">
+            <a:schemeClr val="accent1"/>
+          </a:fillRef>
+          <a:effectRef idx="0">
+            <a:schemeClr val="accent1"/>
+          </a:effectRef>
+          <a:fontRef idx="minor">
+            <a:schemeClr val="lt1"/>
+          </a:fontRef>
+        </p:style>
+        <p:txBody>
+          <a:bodyPr rtlCol="0" anchor="ctr"/>
+          <a:lstStyle/>
+          <a:p>
+            <a:pPr algn="ctr"/>
+            <a:r>
+              <a:rPr lang="en-US" dirty="0"/>
+              <a:t>Consume Food </a:t>
+            </a:r>
+          </a:p>
+        </p:txBody>
+      </p:sp>
+      <p:sp>
+        <p:nvSpPr>
+          <p:cNvPr id="12" name="Oval 11">
+            <a:extLst>
+              <a:ext uri="{FF2B5EF4-FFF2-40B4-BE49-F238E27FC236}">
+                <a16:creationId xmlns:a16="http://schemas.microsoft.com/office/drawing/2014/main" id="{82F33F92-12F6-400B-0776-FB75C45834DC}"/>
+              </a:ext>
+            </a:extLst>
+          </p:cNvPr>
+          <p:cNvSpPr/>
+          <p:nvPr/>
+        </p:nvSpPr>
+        <p:spPr>
+          <a:xfrm>
+            <a:off x="5386020" y="1378750"/>
+            <a:ext cx="1032593" cy="1028893"/>
+          </a:xfrm>
+          <a:prstGeom prst="ellipse">
+            <a:avLst/>
+          </a:prstGeom>
+          <a:solidFill>
+            <a:schemeClr val="accent5">
+              <a:lumMod val="60000"/>
+              <a:lumOff val="40000"/>
+            </a:schemeClr>
+          </a:solidFill>
+        </p:spPr>
+        <p:style>
+          <a:lnRef idx="2">
+            <a:schemeClr val="accent1">
+              <a:shade val="15000"/>
+            </a:schemeClr>
+          </a:lnRef>
+          <a:fillRef idx="1">
+            <a:schemeClr val="accent1"/>
+          </a:fillRef>
+          <a:effectRef idx="0">
+            <a:schemeClr val="accent1"/>
+          </a:effectRef>
+          <a:fontRef idx="minor">
+            <a:schemeClr val="lt1"/>
+          </a:fontRef>
+        </p:style>
+        <p:txBody>
+          <a:bodyPr rtlCol="0" anchor="ctr"/>
+          <a:lstStyle/>
+          <a:p>
+            <a:pPr algn="ctr"/>
+            <a:r>
+              <a:rPr lang="en-US" dirty="0"/>
+              <a:t>Next Too Food</a:t>
+            </a:r>
+          </a:p>
+        </p:txBody>
+      </p:sp>
+      <p:sp>
+        <p:nvSpPr>
+          <p:cNvPr id="2" name="TextBox 1">
+            <a:extLst>
+              <a:ext uri="{FF2B5EF4-FFF2-40B4-BE49-F238E27FC236}">
+                <a16:creationId xmlns:a16="http://schemas.microsoft.com/office/drawing/2014/main" id="{C0C18ED4-4721-FA1B-0BE1-DE3A89010E60}"/>
+              </a:ext>
+            </a:extLst>
+          </p:cNvPr>
+          <p:cNvSpPr txBox="1"/>
+          <p:nvPr/>
+        </p:nvSpPr>
+        <p:spPr>
+          <a:xfrm>
+            <a:off x="2685692" y="363533"/>
+            <a:ext cx="7562116" cy="769441"/>
+          </a:xfrm>
+          <a:prstGeom prst="rect">
+            <a:avLst/>
+          </a:prstGeom>
+          <a:noFill/>
+        </p:spPr>
+        <p:txBody>
+          <a:bodyPr wrap="square">
+            <a:spAutoFit/>
+          </a:bodyPr>
+          <a:lstStyle/>
+          <a:p>
+            <a:r>
+              <a:rPr lang="en-US" sz="4400" b="1" dirty="0"/>
+              <a:t>Execute Action and loop again</a:t>
+            </a:r>
+            <a:endParaRPr lang="en-BE" sz="4400" b="1" dirty="0"/>
+          </a:p>
+        </p:txBody>
+      </p:sp>
+      <p:cxnSp>
+        <p:nvCxnSpPr>
+          <p:cNvPr id="5" name="Straight Arrow Connector 4">
+            <a:extLst>
+              <a:ext uri="{FF2B5EF4-FFF2-40B4-BE49-F238E27FC236}">
+                <a16:creationId xmlns:a16="http://schemas.microsoft.com/office/drawing/2014/main" id="{242893CC-A33F-D28F-FF94-88BF65ADB037}"/>
+              </a:ext>
+            </a:extLst>
+          </p:cNvPr>
+          <p:cNvCxnSpPr>
+            <a:stCxn id="8" idx="4"/>
+          </p:cNvCxnSpPr>
+          <p:nvPr/>
+        </p:nvCxnSpPr>
+        <p:spPr>
+          <a:xfrm>
+            <a:off x="3155051" y="3449626"/>
+            <a:ext cx="1588399" cy="851879"/>
+          </a:xfrm>
+          <a:prstGeom prst="straightConnector1">
+            <a:avLst/>
+          </a:prstGeom>
+          <a:ln>
+            <a:tailEnd type="triangle"/>
+          </a:ln>
+        </p:spPr>
+        <p:style>
+          <a:lnRef idx="1">
+            <a:schemeClr val="accent1"/>
+          </a:lnRef>
+          <a:fillRef idx="0">
+            <a:schemeClr val="accent1"/>
+          </a:fillRef>
+          <a:effectRef idx="0">
+            <a:schemeClr val="accent1"/>
+          </a:effectRef>
+          <a:fontRef idx="minor">
+            <a:schemeClr val="tx1"/>
+          </a:fontRef>
+        </p:style>
+      </p:cxnSp>
+    </p:spTree>
+    <p:extLst>
+      <p:ext uri="{BB962C8B-B14F-4D97-AF65-F5344CB8AC3E}">
+        <p14:creationId xmlns:p14="http://schemas.microsoft.com/office/powerpoint/2010/main" val="1517143195"/>
+      </p:ext>
+    </p:extLst>
+  </p:cSld>
+  <p:clrMapOvr>
+    <a:masterClrMapping/>
+  </p:clrMapOvr>
+</p:sld>
+</file>
+
+<file path=ppt/slides/slide27.xml><?xml version="1.0" encoding="utf-8"?>
 <p:sld xmlns:a="http://schemas.openxmlformats.org/drawingml/2006/main" xmlns:r="http://schemas.openxmlformats.org/officeDocument/2006/relationships" xmlns:p="http://schemas.openxmlformats.org/presentationml/2006/main">
   <p:cSld>
     <p:spTree>
@@ -30040,42 +29902,12 @@
           </a:p>
         </p:txBody>
       </p:sp>
-      <p:pic>
-        <p:nvPicPr>
-          <p:cNvPr id="3" name="Picture 2">
+      <p:sp>
+        <p:nvSpPr>
+          <p:cNvPr id="15" name="TextBox 14">
             <a:extLst>
               <a:ext uri="{FF2B5EF4-FFF2-40B4-BE49-F238E27FC236}">
-                <a16:creationId xmlns:a16="http://schemas.microsoft.com/office/drawing/2014/main" id="{3A014D73-412A-B9DF-C7C7-8C86AE08109F}"/>
-              </a:ext>
-            </a:extLst>
-          </p:cNvPr>
-          <p:cNvPicPr>
-            <a:picLocks noChangeAspect="1"/>
-          </p:cNvPicPr>
-          <p:nvPr/>
-        </p:nvPicPr>
-        <p:blipFill>
-          <a:blip r:embed="rId2"/>
-          <a:stretch>
-            <a:fillRect/>
-          </a:stretch>
-        </p:blipFill>
-        <p:spPr>
-          <a:xfrm>
-            <a:off x="2234391" y="3827176"/>
-            <a:ext cx="7924800" cy="628650"/>
-          </a:xfrm>
-          <a:prstGeom prst="rect">
-            <a:avLst/>
-          </a:prstGeom>
-        </p:spPr>
-      </p:pic>
-      <p:sp>
-        <p:nvSpPr>
-          <p:cNvPr id="6" name="TextBox 5">
-            <a:extLst>
-              <a:ext uri="{FF2B5EF4-FFF2-40B4-BE49-F238E27FC236}">
-                <a16:creationId xmlns:a16="http://schemas.microsoft.com/office/drawing/2014/main" id="{EF70B9E5-2BDF-6A09-5A3C-9A4155F4C838}"/>
+                <a16:creationId xmlns:a16="http://schemas.microsoft.com/office/drawing/2014/main" id="{CAF18793-5F09-FC9C-8509-CDD1E019B9F2}"/>
               </a:ext>
             </a:extLst>
           </p:cNvPr>
@@ -30084,8 +29916,44 @@
         </p:nvSpPr>
         <p:spPr>
           <a:xfrm>
-            <a:off x="3233924" y="4575760"/>
-            <a:ext cx="3804249" cy="646331"/>
+            <a:off x="4729224" y="623746"/>
+            <a:ext cx="2428749" cy="1446550"/>
+          </a:xfrm>
+          <a:prstGeom prst="rect">
+            <a:avLst/>
+          </a:prstGeom>
+          <a:noFill/>
+        </p:spPr>
+        <p:txBody>
+          <a:bodyPr wrap="square">
+            <a:spAutoFit/>
+          </a:bodyPr>
+          <a:lstStyle/>
+          <a:p>
+            <a:r>
+              <a:rPr lang="en-US" sz="4400" b="1" dirty="0"/>
+              <a:t>SOURCES	</a:t>
+            </a:r>
+            <a:endParaRPr lang="en-BE" sz="4400" b="1" dirty="0"/>
+          </a:p>
+        </p:txBody>
+      </p:sp>
+      <p:sp>
+        <p:nvSpPr>
+          <p:cNvPr id="16" name="TextBox 15">
+            <a:extLst>
+              <a:ext uri="{FF2B5EF4-FFF2-40B4-BE49-F238E27FC236}">
+                <a16:creationId xmlns:a16="http://schemas.microsoft.com/office/drawing/2014/main" id="{FF4BEE58-7718-FF19-94A8-3B77329F545E}"/>
+              </a:ext>
+            </a:extLst>
+          </p:cNvPr>
+          <p:cNvSpPr txBox="1"/>
+          <p:nvPr/>
+        </p:nvSpPr>
+        <p:spPr>
+          <a:xfrm>
+            <a:off x="1228724" y="2152650"/>
+            <a:ext cx="9172575" cy="5078313"/>
           </a:xfrm>
           <a:prstGeom prst="rect">
             <a:avLst/>
@@ -30099,174 +29967,108 @@
           <a:lstStyle/>
           <a:p>
             <a:r>
-              <a:rPr lang="en-US" dirty="0"/>
-              <a:t>This Add one effect on the world that meets next action preconditions</a:t>
+              <a:rPr lang="en-US" dirty="0">
+                <a:hlinkClick r:id="rId2"/>
+              </a:rPr>
+              <a:t>https://www.youtube.com/watch?v=qaIF0iaDWRQ&amp;t=59s</a:t>
             </a:r>
-          </a:p>
-        </p:txBody>
-      </p:sp>
-      <p:sp>
-        <p:nvSpPr>
-          <p:cNvPr id="8" name="Oval 7">
-            <a:extLst>
-              <a:ext uri="{FF2B5EF4-FFF2-40B4-BE49-F238E27FC236}">
-                <a16:creationId xmlns:a16="http://schemas.microsoft.com/office/drawing/2014/main" id="{8CDE3CC1-3971-14A9-3398-F09DD9D1F53F}"/>
-              </a:ext>
-            </a:extLst>
-          </p:cNvPr>
-          <p:cNvSpPr/>
-          <p:nvPr/>
-        </p:nvSpPr>
-        <p:spPr>
-          <a:xfrm>
-            <a:off x="2454873" y="2596551"/>
-            <a:ext cx="1159595" cy="918438"/>
-          </a:xfrm>
-          <a:prstGeom prst="ellipse">
-            <a:avLst/>
-          </a:prstGeom>
-          <a:solidFill>
-            <a:schemeClr val="accent2">
-              <a:lumMod val="40000"/>
-              <a:lumOff val="60000"/>
-            </a:schemeClr>
-          </a:solidFill>
-        </p:spPr>
-        <p:style>
-          <a:lnRef idx="2">
-            <a:schemeClr val="accent1">
-              <a:shade val="15000"/>
-            </a:schemeClr>
-          </a:lnRef>
-          <a:fillRef idx="1">
-            <a:schemeClr val="accent1"/>
-          </a:fillRef>
-          <a:effectRef idx="0">
-            <a:schemeClr val="accent1"/>
-          </a:effectRef>
-          <a:fontRef idx="minor">
-            <a:schemeClr val="lt1"/>
-          </a:fontRef>
-        </p:style>
-        <p:txBody>
-          <a:bodyPr rtlCol="0" anchor="ctr"/>
-          <a:lstStyle/>
-          <a:p>
-            <a:pPr algn="ctr"/>
+            <a:endParaRPr lang="en-US" dirty="0"/>
+          </a:p>
+          <a:p>
+            <a:endParaRPr lang="en-US" dirty="0"/>
+          </a:p>
+          <a:p>
             <a:r>
-              <a:rPr lang="en-US" dirty="0"/>
-              <a:t>Go Too Food</a:t>
+              <a:rPr lang="en-US" dirty="0">
+                <a:hlinkClick r:id="rId3"/>
+              </a:rPr>
+              <a:t>https://www.youtube.com/watch?v=DF4dxwqfF1k</a:t>
             </a:r>
-          </a:p>
-        </p:txBody>
-      </p:sp>
-      <p:sp>
-        <p:nvSpPr>
-          <p:cNvPr id="11" name="Oval 10">
-            <a:extLst>
-              <a:ext uri="{FF2B5EF4-FFF2-40B4-BE49-F238E27FC236}">
-                <a16:creationId xmlns:a16="http://schemas.microsoft.com/office/drawing/2014/main" id="{2B5990FA-527C-6474-9C3C-BDF6A9A4B200}"/>
-              </a:ext>
-            </a:extLst>
-          </p:cNvPr>
-          <p:cNvSpPr/>
-          <p:nvPr/>
-        </p:nvSpPr>
-        <p:spPr>
-          <a:xfrm>
-            <a:off x="7492041" y="2316224"/>
-            <a:ext cx="1282076" cy="925376"/>
-          </a:xfrm>
-          <a:prstGeom prst="ellipse">
-            <a:avLst/>
-          </a:prstGeom>
-          <a:solidFill>
-            <a:schemeClr val="accent2">
-              <a:lumMod val="40000"/>
-              <a:lumOff val="60000"/>
-            </a:schemeClr>
-          </a:solidFill>
-        </p:spPr>
-        <p:style>
-          <a:lnRef idx="2">
-            <a:schemeClr val="accent1">
-              <a:shade val="15000"/>
-            </a:schemeClr>
-          </a:lnRef>
-          <a:fillRef idx="1">
-            <a:schemeClr val="accent1"/>
-          </a:fillRef>
-          <a:effectRef idx="0">
-            <a:schemeClr val="accent1"/>
-          </a:effectRef>
-          <a:fontRef idx="minor">
-            <a:schemeClr val="lt1"/>
-          </a:fontRef>
-        </p:style>
-        <p:txBody>
-          <a:bodyPr rtlCol="0" anchor="ctr"/>
-          <a:lstStyle/>
-          <a:p>
-            <a:pPr algn="ctr"/>
+            <a:endParaRPr lang="en-US" dirty="0"/>
+          </a:p>
+          <a:p>
+            <a:endParaRPr lang="en-US" dirty="0"/>
+          </a:p>
+          <a:p>
             <a:r>
-              <a:rPr lang="en-US" dirty="0"/>
-              <a:t>Consume Food </a:t>
+              <a:rPr lang="en-US" dirty="0">
+                <a:hlinkClick r:id="rId4"/>
+              </a:rPr>
+              <a:t>https://medium.com/@vedantchaudhari/goal-oriented-action-planning-34035ed40d0b</a:t>
             </a:r>
-          </a:p>
-        </p:txBody>
-      </p:sp>
-      <p:sp>
-        <p:nvSpPr>
-          <p:cNvPr id="12" name="Oval 11">
-            <a:extLst>
-              <a:ext uri="{FF2B5EF4-FFF2-40B4-BE49-F238E27FC236}">
-                <a16:creationId xmlns:a16="http://schemas.microsoft.com/office/drawing/2014/main" id="{E79BBEEC-D851-DDC2-2E15-10029DA5B6A6}"/>
-              </a:ext>
-            </a:extLst>
-          </p:cNvPr>
-          <p:cNvSpPr/>
-          <p:nvPr/>
-        </p:nvSpPr>
-        <p:spPr>
-          <a:xfrm>
-            <a:off x="4619751" y="1378750"/>
-            <a:ext cx="1032593" cy="1028893"/>
-          </a:xfrm>
-          <a:prstGeom prst="ellipse">
-            <a:avLst/>
-          </a:prstGeom>
-          <a:solidFill>
-            <a:schemeClr val="accent2">
-              <a:lumMod val="40000"/>
-              <a:lumOff val="60000"/>
-            </a:schemeClr>
-          </a:solidFill>
-        </p:spPr>
-        <p:style>
-          <a:lnRef idx="2">
-            <a:schemeClr val="accent1">
-              <a:shade val="15000"/>
-            </a:schemeClr>
-          </a:lnRef>
-          <a:fillRef idx="1">
-            <a:schemeClr val="accent1"/>
-          </a:fillRef>
-          <a:effectRef idx="0">
-            <a:schemeClr val="accent1"/>
-          </a:effectRef>
-          <a:fontRef idx="minor">
-            <a:schemeClr val="lt1"/>
-          </a:fontRef>
-        </p:style>
-        <p:txBody>
-          <a:bodyPr rtlCol="0" anchor="ctr"/>
-          <a:lstStyle/>
-          <a:p>
-            <a:pPr algn="ctr"/>
+            <a:endParaRPr lang="en-US" dirty="0"/>
+          </a:p>
+          <a:p>
+            <a:endParaRPr lang="en-US" dirty="0"/>
+          </a:p>
+          <a:p>
             <a:r>
-              <a:rPr lang="en-US" dirty="0"/>
-              <a:t>Next Too Food</a:t>
+              <a:rPr lang="en-US" dirty="0">
+                <a:hlinkClick r:id="rId5"/>
+              </a:rPr>
+              <a:t>https://www.youtube.com/watch?v=gm7K68663rA</a:t>
             </a:r>
+            <a:endParaRPr lang="en-US" dirty="0"/>
+          </a:p>
+          <a:p>
+            <a:endParaRPr lang="en-US" dirty="0"/>
+          </a:p>
+          <a:p>
+            <a:r>
+              <a:rPr lang="en-US" dirty="0">
+                <a:hlinkClick r:id="rId6"/>
+              </a:rPr>
+              <a:t>https://www.geeksforgeeks.org/dsa/introduction-to-dijkstras-shortest-path-algorithm/</a:t>
+            </a:r>
+            <a:endParaRPr lang="en-US" dirty="0"/>
+          </a:p>
+          <a:p>
+            <a:endParaRPr lang="en-US" dirty="0"/>
+          </a:p>
+          <a:p>
+            <a:r>
+              <a:rPr lang="en-US" dirty="0">
+                <a:hlinkClick r:id="rId7"/>
+              </a:rPr>
+              <a:t>https://www.geeksforgeeks.org/dsa/difference-between-dijkstras-algorithm-and-a-search-algorithm/</a:t>
+            </a:r>
+            <a:endParaRPr lang="en-US" dirty="0"/>
+          </a:p>
+          <a:p>
+            <a:endParaRPr lang="en-US" dirty="0"/>
+          </a:p>
+          <a:p>
+            <a:r>
+              <a:rPr lang="en-US" dirty="0">
+                <a:hlinkClick r:id="rId8"/>
+              </a:rPr>
+              <a:t>https://www.youtube.com/watch?v=jUSrVF8mve4</a:t>
+            </a:r>
+            <a:endParaRPr lang="en-US" dirty="0"/>
+          </a:p>
+          <a:p>
+            <a:endParaRPr lang="en-US" dirty="0"/>
+          </a:p>
+          <a:p>
+            <a:r>
+              <a:rPr lang="en-US" dirty="0">
+                <a:hlinkClick r:id="rId9"/>
+              </a:rPr>
+              <a:t>A* Search Algorithm - </a:t>
+            </a:r>
+            <a:r>
+              <a:rPr lang="en-US" dirty="0" err="1">
+                <a:hlinkClick r:id="rId9"/>
+              </a:rPr>
+              <a:t>GeeksforGeeks</a:t>
+            </a:r>
+            <a:endParaRPr lang="en-US" dirty="0"/>
+          </a:p>
+          <a:p>
+            <a:endParaRPr lang="en-US" dirty="0"/>
+          </a:p>
+          <a:p>
+            <a:endParaRPr lang="en-US" dirty="0"/>
           </a:p>
         </p:txBody>
       </p:sp>
@@ -30283,7 +30085,7 @@
 </p:sld>
 </file>
 
-<file path=ppt/slides/slide29.xml><?xml version="1.0" encoding="utf-8"?>
+<file path=ppt/slides/slide28.xml><?xml version="1.0" encoding="utf-8"?>
 <p:sld xmlns:a="http://schemas.openxmlformats.org/drawingml/2006/main" xmlns:r="http://schemas.openxmlformats.org/officeDocument/2006/relationships" xmlns:p="http://schemas.openxmlformats.org/presentationml/2006/main">
   <p:cSld>
     <p:spTree>

</xml_diff>